<commit_message>
updated to specs from meeting
</commit_message>
<xml_diff>
--- a/ActiveNet Trainer/PowerPoint Creations/WelcomeToActiveNet.pptx
+++ b/ActiveNet Trainer/PowerPoint Creations/WelcomeToActiveNet.pptx
@@ -4,6 +4,9 @@
   <p:sldMasterIdLst>
     <p:sldMasterId id="2147483660" r:id="rId1"/>
   </p:sldMasterIdLst>
+  <p:notesMasterIdLst>
+    <p:notesMasterId r:id="rId15"/>
+  </p:notesMasterIdLst>
   <p:sldIdLst>
     <p:sldId id="256" r:id="rId2"/>
     <p:sldId id="257" r:id="rId3"/>
@@ -2638,6 +2641,29 @@
         </a:p>
       </dgm:t>
     </dgm:pt>
+    <dgm:pt modelId="{70D5F956-7B68-487A-8410-5E02EFD102BE}">
+      <dgm:prSet/>
+      <dgm:spPr/>
+      <dgm:t>
+        <a:bodyPr/>
+        <a:lstStyle/>
+        <a:p>
+          <a:r>
+            <a:rPr lang="en-US" dirty="0" smtClean="0"/>
+            <a:t>To navigate each screen, it is highly recommended that you select the button on the slide, not the arrows on the side, to progress. The tutorials are made to jump from page whereas the side buttons are not.</a:t>
+          </a:r>
+          <a:endParaRPr lang="en-US" dirty="0"/>
+        </a:p>
+      </dgm:t>
+    </dgm:pt>
+    <dgm:pt modelId="{75A1960E-8176-40D9-93F5-7BD843C63841}" type="parTrans" cxnId="{12622349-3AAA-4E44-B54D-508158B466F0}">
+      <dgm:prSet/>
+      <dgm:spPr/>
+    </dgm:pt>
+    <dgm:pt modelId="{783066E1-009B-44D0-90D6-AD2E71767F64}" type="sibTrans" cxnId="{12622349-3AAA-4E44-B54D-508158B466F0}">
+      <dgm:prSet/>
+      <dgm:spPr/>
+    </dgm:pt>
     <dgm:pt modelId="{4703772F-8068-4BD3-AAB9-763FB9F544EB}" type="pres">
       <dgm:prSet presAssocID="{E4949E61-7429-4064-85AF-11B13624FC5C}" presName="linear" presStyleCnt="0">
         <dgm:presLayoutVars>
@@ -2818,6 +2844,7 @@
     <dgm:cxn modelId="{913908F8-67DB-43B3-AA53-4DEBA69E3180}" type="presOf" srcId="{2C44C02D-3F95-40FA-8B02-323A1A8F6C8C}" destId="{AD460550-43EC-40B8-997B-C0ED97AD36BD}" srcOrd="1" destOrd="0" presId="urn:microsoft.com/office/officeart/2005/8/layout/list1"/>
     <dgm:cxn modelId="{34B52E81-EBEC-4BE7-817C-84B4814EE61D}" type="presOf" srcId="{2C44C02D-3F95-40FA-8B02-323A1A8F6C8C}" destId="{D9AB7494-1DAF-47C1-8F36-07A9D8E69D80}" srcOrd="0" destOrd="0" presId="urn:microsoft.com/office/officeart/2005/8/layout/list1"/>
     <dgm:cxn modelId="{3533D016-5FFE-42D4-83A3-6F3A96692FDE}" srcId="{E4949E61-7429-4064-85AF-11B13624FC5C}" destId="{B572DE22-A925-4ECD-A88F-06E6BF76BA73}" srcOrd="2" destOrd="0" parTransId="{A89781FC-013A-46B4-8430-150B6187525A}" sibTransId="{0CDF46F5-3C58-4DED-A5D6-8CFA3175E48F}"/>
+    <dgm:cxn modelId="{E0F7D420-FB77-487D-B169-73F0417A3123}" type="presOf" srcId="{70D5F956-7B68-487A-8410-5E02EFD102BE}" destId="{1011A046-E4B6-4B7C-8728-12B192EFC7EE}" srcOrd="0" destOrd="1" presId="urn:microsoft.com/office/officeart/2005/8/layout/list1"/>
     <dgm:cxn modelId="{7F56209A-BA99-4DC0-8F4B-11A7B0FEA146}" srcId="{2C44C02D-3F95-40FA-8B02-323A1A8F6C8C}" destId="{F3FF9728-752C-4EEB-BBB8-7B09284EB7BE}" srcOrd="0" destOrd="0" parTransId="{0A9E9EC2-7627-4788-8DCC-983015A3C00A}" sibTransId="{300F6FD2-8058-4784-A2B9-A9AC7061C159}"/>
     <dgm:cxn modelId="{30CDDFCF-9BEE-48D1-8077-5611C9F1D897}" srcId="{E4949E61-7429-4064-85AF-11B13624FC5C}" destId="{B282E3E1-7E30-40B7-9429-F4D206936FFD}" srcOrd="0" destOrd="0" parTransId="{25057C6F-0304-48E3-8705-6F04F32233FF}" sibTransId="{71A9C2D1-3C77-4753-986D-47DDD71BC80D}"/>
     <dgm:cxn modelId="{0A5CE9F7-38E4-44C8-85EA-D34A16DF0B37}" type="presOf" srcId="{C5FD6228-327F-4E61-8837-01163B6608B5}" destId="{2E36BFED-83AF-4FFE-9C2C-523AEB561C0F}" srcOrd="0" destOrd="0" presId="urn:microsoft.com/office/officeart/2005/8/layout/list1"/>
@@ -2826,12 +2853,13 @@
     <dgm:cxn modelId="{65C085C6-226B-44BC-8D9D-D2C052ECBA90}" type="presOf" srcId="{F3FF9728-752C-4EEB-BBB8-7B09284EB7BE}" destId="{1011A046-E4B6-4B7C-8728-12B192EFC7EE}" srcOrd="0" destOrd="0" presId="urn:microsoft.com/office/officeart/2005/8/layout/list1"/>
     <dgm:cxn modelId="{67585404-99C9-4CFE-A70B-7F22164BA000}" type="presOf" srcId="{B282E3E1-7E30-40B7-9429-F4D206936FFD}" destId="{A937C790-E74A-40EB-B98B-A0558E6ECB37}" srcOrd="0" destOrd="0" presId="urn:microsoft.com/office/officeart/2005/8/layout/list1"/>
     <dgm:cxn modelId="{149B3667-F9ED-4AF6-BA2F-C76213284A68}" srcId="{B572DE22-A925-4ECD-A88F-06E6BF76BA73}" destId="{C5FD6228-327F-4E61-8837-01163B6608B5}" srcOrd="0" destOrd="0" parTransId="{3642322B-61CD-481C-95D5-817EE5663D21}" sibTransId="{C1B70AAE-662F-4607-A294-047D75782E4E}"/>
+    <dgm:cxn modelId="{12622349-3AAA-4E44-B54D-508158B466F0}" srcId="{2C44C02D-3F95-40FA-8B02-323A1A8F6C8C}" destId="{70D5F956-7B68-487A-8410-5E02EFD102BE}" srcOrd="1" destOrd="0" parTransId="{75A1960E-8176-40D9-93F5-7BD843C63841}" sibTransId="{783066E1-009B-44D0-90D6-AD2E71767F64}"/>
     <dgm:cxn modelId="{CF553CA6-C05B-4224-9781-B990192D73D9}" type="presOf" srcId="{B572DE22-A925-4ECD-A88F-06E6BF76BA73}" destId="{C7CDFE6B-3EA6-48B8-A0EC-4E63A10A2AEC}" srcOrd="0" destOrd="0" presId="urn:microsoft.com/office/officeart/2005/8/layout/list1"/>
     <dgm:cxn modelId="{9BECDAD5-C41D-46BB-A7D3-0F8B1142E422}" srcId="{E4949E61-7429-4064-85AF-11B13624FC5C}" destId="{2C44C02D-3F95-40FA-8B02-323A1A8F6C8C}" srcOrd="1" destOrd="0" parTransId="{D64D47CF-9B0B-475B-A343-03C9BF12B914}" sibTransId="{FD9F65DD-27E9-4D36-9D80-AE6E9B097EBF}"/>
     <dgm:cxn modelId="{462DFE37-B6FA-4E7F-93CE-F28CD1313224}" type="presOf" srcId="{B282E3E1-7E30-40B7-9429-F4D206936FFD}" destId="{682645C3-1E98-4AEC-A135-E8A3EE4C1FF0}" srcOrd="1" destOrd="0" presId="urn:microsoft.com/office/officeart/2005/8/layout/list1"/>
-    <dgm:cxn modelId="{6409E234-E65B-4E32-B2D2-84A37A6E3692}" type="presOf" srcId="{7D62FBF0-7FCC-4B39-937E-68434CB0C5E0}" destId="{1011A046-E4B6-4B7C-8728-12B192EFC7EE}" srcOrd="0" destOrd="1" presId="urn:microsoft.com/office/officeart/2005/8/layout/list1"/>
+    <dgm:cxn modelId="{6409E234-E65B-4E32-B2D2-84A37A6E3692}" type="presOf" srcId="{7D62FBF0-7FCC-4B39-937E-68434CB0C5E0}" destId="{1011A046-E4B6-4B7C-8728-12B192EFC7EE}" srcOrd="0" destOrd="2" presId="urn:microsoft.com/office/officeart/2005/8/layout/list1"/>
     <dgm:cxn modelId="{F09DF3B2-E36D-4D54-A79A-6E2B9BC55B7A}" type="presOf" srcId="{49D34B1C-0567-4324-8DB8-934D0433C9EA}" destId="{7BBC3321-FBE9-40FC-82A7-A579F3825EA8}" srcOrd="0" destOrd="0" presId="urn:microsoft.com/office/officeart/2005/8/layout/list1"/>
-    <dgm:cxn modelId="{B584875A-4A56-4C8F-902E-47D2F69A4E06}" srcId="{2C44C02D-3F95-40FA-8B02-323A1A8F6C8C}" destId="{7D62FBF0-7FCC-4B39-937E-68434CB0C5E0}" srcOrd="1" destOrd="0" parTransId="{8525580A-8F5F-4C79-A5E3-497FB2355A06}" sibTransId="{87B771E4-B301-4E04-BE5E-4B255DC4A3BB}"/>
+    <dgm:cxn modelId="{B584875A-4A56-4C8F-902E-47D2F69A4E06}" srcId="{2C44C02D-3F95-40FA-8B02-323A1A8F6C8C}" destId="{7D62FBF0-7FCC-4B39-937E-68434CB0C5E0}" srcOrd="2" destOrd="0" parTransId="{8525580A-8F5F-4C79-A5E3-497FB2355A06}" sibTransId="{87B771E4-B301-4E04-BE5E-4B255DC4A3BB}"/>
     <dgm:cxn modelId="{1890CA79-1B4A-4ABF-BD8A-08A8A1D4861E}" type="presOf" srcId="{E4949E61-7429-4064-85AF-11B13624FC5C}" destId="{4703772F-8068-4BD3-AAB9-763FB9F544EB}" srcOrd="0" destOrd="0" presId="urn:microsoft.com/office/officeart/2005/8/layout/list1"/>
     <dgm:cxn modelId="{54427DF8-E828-44BD-AE97-43F8C8940EE1}" type="presParOf" srcId="{4703772F-8068-4BD3-AAB9-763FB9F544EB}" destId="{0A0A04F5-5B7B-477B-B78B-CCEE45972989}" srcOrd="0" destOrd="0" presId="urn:microsoft.com/office/officeart/2005/8/layout/list1"/>
     <dgm:cxn modelId="{135B7CD1-5189-491B-9DF9-CEFCC98456BB}" type="presParOf" srcId="{0A0A04F5-5B7B-477B-B78B-CCEE45972989}" destId="{A937C790-E74A-40EB-B98B-A0558E6ECB37}" srcOrd="0" destOrd="0" presId="urn:microsoft.com/office/officeart/2005/8/layout/list1"/>
@@ -2855,7 +2883,7 @@
   <dgm:whole/>
   <dgm:extLst>
     <a:ext uri="http://schemas.microsoft.com/office/drawing/2008/diagram">
-      <dsp:dataModelExt xmlns:dsp="http://schemas.microsoft.com/office/drawing/2008/diagram" relId="rId8" minVer="http://schemas.openxmlformats.org/drawingml/2006/diagram"/>
+      <dsp:dataModelExt xmlns:dsp="http://schemas.microsoft.com/office/drawing/2008/diagram" relId="rId9" minVer="http://schemas.openxmlformats.org/drawingml/2006/diagram"/>
     </a:ext>
   </dgm:extLst>
 </dgm:dataModel>
@@ -2921,7 +2949,15 @@
         <a:p>
           <a:r>
             <a:rPr lang="en-US" dirty="0" smtClean="0"/>
-            <a:t>Before you continue with the course material, you must know that you need a 90% or better on most exams to gain access on our system. You only have 2 attempts to pass before your access is restricted.</a:t>
+            <a:t>Before you continue with the course material, </a:t>
+          </a:r>
+          <a:r>
+            <a:rPr lang="en-US" dirty="0" smtClean="0"/>
+            <a:t>note that each exam’s pass-rate. This is the grade you must get on the exam in order to continue. You </a:t>
+          </a:r>
+          <a:r>
+            <a:rPr lang="en-US" dirty="0" smtClean="0"/>
+            <a:t>only have 2 attempts to pass before your access is restricted.</a:t>
           </a:r>
           <a:endParaRPr lang="en-US" dirty="0"/>
         </a:p>
@@ -3733,8 +3769,8 @@
       </dsp:nvSpPr>
       <dsp:spPr>
         <a:xfrm>
-          <a:off x="0" y="314684"/>
-          <a:ext cx="4709160" cy="921375"/>
+          <a:off x="0" y="487507"/>
+          <a:ext cx="4709160" cy="779625"/>
         </a:xfrm>
         <a:prstGeom prst="rect">
           <a:avLst/>
@@ -3775,12 +3811,12 @@
         <a:fontRef idx="minor"/>
       </dsp:style>
       <dsp:txBody>
-        <a:bodyPr spcFirstLastPara="0" vert="horz" wrap="square" lIns="365483" tIns="270764" rIns="365483" bIns="92456" numCol="1" spcCol="1270" anchor="t" anchorCtr="0">
+        <a:bodyPr spcFirstLastPara="0" vert="horz" wrap="square" lIns="365483" tIns="229108" rIns="365483" bIns="78232" numCol="1" spcCol="1270" anchor="t" anchorCtr="0">
           <a:noAutofit/>
         </a:bodyPr>
         <a:lstStyle/>
         <a:p>
-          <a:pPr marL="114300" lvl="1" indent="-114300" algn="l" defTabSz="577850">
+          <a:pPr marL="57150" lvl="1" indent="-57150" algn="l" defTabSz="488950">
             <a:lnSpc>
               <a:spcPct val="90000"/>
             </a:lnSpc>
@@ -3793,15 +3829,15 @@
             <a:buChar char="••"/>
           </a:pPr>
           <a:r>
-            <a:rPr lang="en-US" sz="1300" kern="1200" dirty="0" smtClean="0"/>
+            <a:rPr lang="en-US" sz="1100" kern="1200" dirty="0" smtClean="0"/>
             <a:t>For the sake of this course, you do not need to type any data into the text fields. Simply click the correct field and follow the on-screen instructions!</a:t>
           </a:r>
-          <a:endParaRPr lang="en-US" sz="1300" kern="1200" dirty="0"/>
+          <a:endParaRPr lang="en-US" sz="1100" kern="1200" dirty="0"/>
         </a:p>
       </dsp:txBody>
       <dsp:txXfrm>
-        <a:off x="0" y="314684"/>
-        <a:ext cx="4709160" cy="921375"/>
+        <a:off x="0" y="487507"/>
+        <a:ext cx="4709160" cy="779625"/>
       </dsp:txXfrm>
     </dsp:sp>
     <dsp:sp modelId="{682645C3-1E98-4AEC-A135-E8A3EE4C1FF0}">
@@ -3811,8 +3847,8 @@
       </dsp:nvSpPr>
       <dsp:spPr>
         <a:xfrm>
-          <a:off x="235458" y="122804"/>
-          <a:ext cx="3296412" cy="383760"/>
+          <a:off x="235458" y="325147"/>
+          <a:ext cx="3296412" cy="324720"/>
         </a:xfrm>
         <a:prstGeom prst="roundRect">
           <a:avLst/>
@@ -3886,7 +3922,7 @@
         </a:bodyPr>
         <a:lstStyle/>
         <a:p>
-          <a:pPr lvl="0" algn="l" defTabSz="577850">
+          <a:pPr lvl="0" algn="l" defTabSz="488950">
             <a:lnSpc>
               <a:spcPct val="90000"/>
             </a:lnSpc>
@@ -3898,15 +3934,15 @@
             </a:spcAft>
           </a:pPr>
           <a:r>
-            <a:rPr lang="en-US" sz="1300" kern="1200" dirty="0" smtClean="0"/>
+            <a:rPr lang="en-US" sz="1100" kern="1200" dirty="0" smtClean="0"/>
             <a:t>No Typing Needed!</a:t>
           </a:r>
-          <a:endParaRPr lang="en-US" sz="1300" kern="1200" dirty="0"/>
+          <a:endParaRPr lang="en-US" sz="1100" kern="1200" dirty="0"/>
         </a:p>
       </dsp:txBody>
       <dsp:txXfrm>
-        <a:off x="254192" y="141538"/>
-        <a:ext cx="3258944" cy="346292"/>
+        <a:off x="251310" y="340999"/>
+        <a:ext cx="3264708" cy="293016"/>
       </dsp:txXfrm>
     </dsp:sp>
     <dsp:sp modelId="{1011A046-E4B6-4B7C-8728-12B192EFC7EE}">
@@ -3916,8 +3952,8 @@
       </dsp:nvSpPr>
       <dsp:spPr>
         <a:xfrm>
-          <a:off x="0" y="1498140"/>
-          <a:ext cx="4709160" cy="1310400"/>
+          <a:off x="0" y="1488892"/>
+          <a:ext cx="4709160" cy="1455300"/>
         </a:xfrm>
         <a:prstGeom prst="rect">
           <a:avLst/>
@@ -3958,12 +3994,12 @@
         <a:fontRef idx="minor"/>
       </dsp:style>
       <dsp:txBody>
-        <a:bodyPr spcFirstLastPara="0" vert="horz" wrap="square" lIns="365483" tIns="270764" rIns="365483" bIns="92456" numCol="1" spcCol="1270" anchor="t" anchorCtr="0">
+        <a:bodyPr spcFirstLastPara="0" vert="horz" wrap="square" lIns="365483" tIns="229108" rIns="365483" bIns="78232" numCol="1" spcCol="1270" anchor="t" anchorCtr="0">
           <a:noAutofit/>
         </a:bodyPr>
         <a:lstStyle/>
         <a:p>
-          <a:pPr marL="114300" lvl="1" indent="-114300" algn="l" defTabSz="577850">
+          <a:pPr marL="57150" lvl="1" indent="-57150" algn="l" defTabSz="488950">
             <a:lnSpc>
               <a:spcPct val="90000"/>
             </a:lnSpc>
@@ -3976,13 +4012,13 @@
             <a:buChar char="••"/>
           </a:pPr>
           <a:r>
-            <a:rPr lang="en-US" sz="1300" kern="1200" dirty="0" smtClean="0"/>
+            <a:rPr lang="en-US" sz="1100" kern="1200" dirty="0" smtClean="0"/>
             <a:t>If you come across a bug in the trainer, click the arrow on the webpage to advance to the next screen to send us related feedback.</a:t>
           </a:r>
-          <a:endParaRPr lang="en-US" sz="1300" kern="1200" dirty="0"/>
+          <a:endParaRPr lang="en-US" sz="1100" kern="1200" dirty="0"/>
         </a:p>
         <a:p>
-          <a:pPr marL="114300" lvl="1" indent="-114300" algn="l" defTabSz="577850">
+          <a:pPr marL="57150" lvl="1" indent="-57150" algn="l" defTabSz="488950">
             <a:lnSpc>
               <a:spcPct val="90000"/>
             </a:lnSpc>
@@ -3995,15 +4031,34 @@
             <a:buChar char="••"/>
           </a:pPr>
           <a:r>
-            <a:rPr lang="en-US" sz="1300" kern="1200" dirty="0" smtClean="0"/>
+            <a:rPr lang="en-US" sz="1100" kern="1200" dirty="0" smtClean="0"/>
+            <a:t>To navigate each screen, it is highly recommended that you select the button on the slide, not the arrows on the side, to progress. The tutorials are made to jump from page whereas the side buttons are not.</a:t>
+          </a:r>
+          <a:endParaRPr lang="en-US" sz="1100" kern="1200" dirty="0"/>
+        </a:p>
+        <a:p>
+          <a:pPr marL="57150" lvl="1" indent="-57150" algn="l" defTabSz="488950">
+            <a:lnSpc>
+              <a:spcPct val="90000"/>
+            </a:lnSpc>
+            <a:spcBef>
+              <a:spcPct val="0"/>
+            </a:spcBef>
+            <a:spcAft>
+              <a:spcPct val="15000"/>
+            </a:spcAft>
+            <a:buChar char="••"/>
+          </a:pPr>
+          <a:r>
+            <a:rPr lang="en-US" sz="1100" kern="1200" dirty="0" smtClean="0"/>
             <a:t>Please note that you will still be tested on the related material!</a:t>
           </a:r>
-          <a:endParaRPr lang="en-US" sz="1300" kern="1200" dirty="0"/>
+          <a:endParaRPr lang="en-US" sz="1100" kern="1200" dirty="0"/>
         </a:p>
       </dsp:txBody>
       <dsp:txXfrm>
-        <a:off x="0" y="1498140"/>
-        <a:ext cx="4709160" cy="1310400"/>
+        <a:off x="0" y="1488892"/>
+        <a:ext cx="4709160" cy="1455300"/>
       </dsp:txXfrm>
     </dsp:sp>
     <dsp:sp modelId="{AD460550-43EC-40B8-997B-C0ED97AD36BD}">
@@ -4013,8 +4068,8 @@
       </dsp:nvSpPr>
       <dsp:spPr>
         <a:xfrm>
-          <a:off x="235458" y="1306259"/>
-          <a:ext cx="3296412" cy="383760"/>
+          <a:off x="235458" y="1326532"/>
+          <a:ext cx="3296412" cy="324720"/>
         </a:xfrm>
         <a:prstGeom prst="roundRect">
           <a:avLst/>
@@ -4088,7 +4143,7 @@
         </a:bodyPr>
         <a:lstStyle/>
         <a:p>
-          <a:pPr lvl="0" algn="l" defTabSz="577850">
+          <a:pPr lvl="0" algn="l" defTabSz="488950">
             <a:lnSpc>
               <a:spcPct val="90000"/>
             </a:lnSpc>
@@ -4100,15 +4155,15 @@
             </a:spcAft>
           </a:pPr>
           <a:r>
-            <a:rPr lang="en-US" sz="1300" kern="1200" dirty="0" smtClean="0"/>
+            <a:rPr lang="en-US" sz="1100" kern="1200" dirty="0" smtClean="0"/>
             <a:t>Bugs</a:t>
           </a:r>
-          <a:endParaRPr lang="en-US" sz="1300" kern="1200" dirty="0"/>
+          <a:endParaRPr lang="en-US" sz="1100" kern="1200" dirty="0"/>
         </a:p>
       </dsp:txBody>
       <dsp:txXfrm>
-        <a:off x="254192" y="1324993"/>
-        <a:ext cx="3258944" cy="346292"/>
+        <a:off x="251310" y="1342384"/>
+        <a:ext cx="3264708" cy="293016"/>
       </dsp:txXfrm>
     </dsp:sp>
     <dsp:sp modelId="{2E36BFED-83AF-4FFE-9C2C-523AEB561C0F}">
@@ -4118,8 +4173,8 @@
       </dsp:nvSpPr>
       <dsp:spPr>
         <a:xfrm>
-          <a:off x="0" y="3070620"/>
-          <a:ext cx="4709160" cy="921375"/>
+          <a:off x="0" y="3165952"/>
+          <a:ext cx="4709160" cy="623700"/>
         </a:xfrm>
         <a:prstGeom prst="rect">
           <a:avLst/>
@@ -4160,12 +4215,12 @@
         <a:fontRef idx="minor"/>
       </dsp:style>
       <dsp:txBody>
-        <a:bodyPr spcFirstLastPara="0" vert="horz" wrap="square" lIns="365483" tIns="270764" rIns="365483" bIns="92456" numCol="1" spcCol="1270" anchor="t" anchorCtr="0">
+        <a:bodyPr spcFirstLastPara="0" vert="horz" wrap="square" lIns="365483" tIns="229108" rIns="365483" bIns="78232" numCol="1" spcCol="1270" anchor="t" anchorCtr="0">
           <a:noAutofit/>
         </a:bodyPr>
         <a:lstStyle/>
         <a:p>
-          <a:pPr marL="114300" lvl="1" indent="-114300" algn="l" defTabSz="577850">
+          <a:pPr marL="57150" lvl="1" indent="-57150" algn="l" defTabSz="488950">
             <a:lnSpc>
               <a:spcPct val="90000"/>
             </a:lnSpc>
@@ -4178,15 +4233,15 @@
             <a:buChar char="••"/>
           </a:pPr>
           <a:r>
-            <a:rPr lang="en-US" sz="1300" kern="1200" dirty="0" smtClean="0"/>
+            <a:rPr lang="en-US" sz="1100" kern="1200" dirty="0" smtClean="0"/>
             <a:t>We want to know your feedback! Whether there is a bug, an error in context or another topic you want us to cover, Let Us Know!</a:t>
           </a:r>
-          <a:endParaRPr lang="en-US" sz="1300" kern="1200" dirty="0"/>
+          <a:endParaRPr lang="en-US" sz="1100" kern="1200" dirty="0"/>
         </a:p>
       </dsp:txBody>
       <dsp:txXfrm>
-        <a:off x="0" y="3070620"/>
-        <a:ext cx="4709160" cy="921375"/>
+        <a:off x="0" y="3165952"/>
+        <a:ext cx="4709160" cy="623700"/>
       </dsp:txXfrm>
     </dsp:sp>
     <dsp:sp modelId="{AD1E4896-C60D-4A2E-9D3D-DF9408744A43}">
@@ -4196,8 +4251,8 @@
       </dsp:nvSpPr>
       <dsp:spPr>
         <a:xfrm>
-          <a:off x="235458" y="2878740"/>
-          <a:ext cx="3296412" cy="383760"/>
+          <a:off x="235458" y="3003592"/>
+          <a:ext cx="3296412" cy="324720"/>
         </a:xfrm>
         <a:prstGeom prst="roundRect">
           <a:avLst/>
@@ -4271,7 +4326,7 @@
         </a:bodyPr>
         <a:lstStyle/>
         <a:p>
-          <a:pPr lvl="0" algn="l" defTabSz="577850">
+          <a:pPr lvl="0" algn="l" defTabSz="488950">
             <a:lnSpc>
               <a:spcPct val="90000"/>
             </a:lnSpc>
@@ -4283,15 +4338,15 @@
             </a:spcAft>
           </a:pPr>
           <a:r>
-            <a:rPr lang="en-US" sz="1300" kern="1200" dirty="0" smtClean="0"/>
+            <a:rPr lang="en-US" sz="1100" kern="1200" dirty="0" smtClean="0"/>
             <a:t>Feedback Wanted!</a:t>
           </a:r>
-          <a:endParaRPr lang="en-US" sz="1300" kern="1200" dirty="0"/>
+          <a:endParaRPr lang="en-US" sz="1100" kern="1200" dirty="0"/>
         </a:p>
       </dsp:txBody>
       <dsp:txXfrm>
-        <a:off x="254192" y="2897474"/>
-        <a:ext cx="3258944" cy="346292"/>
+        <a:off x="251310" y="3019444"/>
+        <a:ext cx="3264708" cy="293016"/>
       </dsp:txXfrm>
     </dsp:sp>
   </dsp:spTree>
@@ -4374,7 +4429,15 @@
           </a:pPr>
           <a:r>
             <a:rPr lang="en-US" sz="1200" kern="1200" dirty="0" smtClean="0"/>
-            <a:t>Before you continue with the course material, you must know that you need a 90% or better on most exams to gain access on our system. You only have 2 attempts to pass before your access is restricted.</a:t>
+            <a:t>Before you continue with the course material, </a:t>
+          </a:r>
+          <a:r>
+            <a:rPr lang="en-US" sz="1200" kern="1200" dirty="0" smtClean="0"/>
+            <a:t>note that each exam’s pass-rate. This is the grade you must get on the exam in order to continue. You </a:t>
+          </a:r>
+          <a:r>
+            <a:rPr lang="en-US" sz="1200" kern="1200" dirty="0" smtClean="0"/>
+            <a:t>only have 2 attempts to pass before your access is restricted.</a:t>
           </a:r>
           <a:endParaRPr lang="en-US" sz="1200" kern="1200" dirty="0"/>
         </a:p>
@@ -9056,6 +9119,440 @@
 </dgm:styleDef>
 </file>
 
+<file path=ppt/notesMasters/notesMaster1.xml><?xml version="1.0" encoding="utf-8"?>
+<p:notesMaster xmlns:a="http://schemas.openxmlformats.org/drawingml/2006/main" xmlns:r="http://schemas.openxmlformats.org/officeDocument/2006/relationships" xmlns:p="http://schemas.openxmlformats.org/presentationml/2006/main">
+  <p:cSld>
+    <p:bg>
+      <p:bgRef idx="1001">
+        <a:schemeClr val="bg1"/>
+      </p:bgRef>
+    </p:bg>
+    <p:spTree>
+      <p:nvGrpSpPr>
+        <p:cNvPr id="1" name=""/>
+        <p:cNvGrpSpPr/>
+        <p:nvPr/>
+      </p:nvGrpSpPr>
+      <p:grpSpPr>
+        <a:xfrm>
+          <a:off x="0" y="0"/>
+          <a:ext cx="0" cy="0"/>
+          <a:chOff x="0" y="0"/>
+          <a:chExt cx="0" cy="0"/>
+        </a:xfrm>
+      </p:grpSpPr>
+      <p:sp>
+        <p:nvSpPr>
+          <p:cNvPr id="2" name="Header Placeholder 1"/>
+          <p:cNvSpPr>
+            <a:spLocks noGrp="1"/>
+          </p:cNvSpPr>
+          <p:nvPr>
+            <p:ph type="hdr" sz="quarter"/>
+          </p:nvPr>
+        </p:nvSpPr>
+        <p:spPr>
+          <a:xfrm>
+            <a:off x="0" y="0"/>
+            <a:ext cx="2971800" cy="458788"/>
+          </a:xfrm>
+          <a:prstGeom prst="rect">
+            <a:avLst/>
+          </a:prstGeom>
+        </p:spPr>
+        <p:txBody>
+          <a:bodyPr vert="horz" lIns="91440" tIns="45720" rIns="91440" bIns="45720" rtlCol="0"/>
+          <a:lstStyle>
+            <a:lvl1pPr algn="l">
+              <a:defRPr sz="1200"/>
+            </a:lvl1pPr>
+          </a:lstStyle>
+          <a:p>
+            <a:endParaRPr lang="en-US"/>
+          </a:p>
+        </p:txBody>
+      </p:sp>
+      <p:sp>
+        <p:nvSpPr>
+          <p:cNvPr id="3" name="Date Placeholder 2"/>
+          <p:cNvSpPr>
+            <a:spLocks noGrp="1"/>
+          </p:cNvSpPr>
+          <p:nvPr>
+            <p:ph type="dt" idx="1"/>
+          </p:nvPr>
+        </p:nvSpPr>
+        <p:spPr>
+          <a:xfrm>
+            <a:off x="3884613" y="0"/>
+            <a:ext cx="2971800" cy="458788"/>
+          </a:xfrm>
+          <a:prstGeom prst="rect">
+            <a:avLst/>
+          </a:prstGeom>
+        </p:spPr>
+        <p:txBody>
+          <a:bodyPr vert="horz" lIns="91440" tIns="45720" rIns="91440" bIns="45720" rtlCol="0"/>
+          <a:lstStyle>
+            <a:lvl1pPr algn="r">
+              <a:defRPr sz="1200"/>
+            </a:lvl1pPr>
+          </a:lstStyle>
+          <a:p>
+            <a:fld id="{06D2A18A-E17A-443E-8915-1E089140DE46}" type="datetimeFigureOut">
+              <a:rPr lang="en-US" smtClean="0"/>
+              <a:t>12/7/2016</a:t>
+            </a:fld>
+            <a:endParaRPr lang="en-US"/>
+          </a:p>
+        </p:txBody>
+      </p:sp>
+      <p:sp>
+        <p:nvSpPr>
+          <p:cNvPr id="4" name="Slide Image Placeholder 3"/>
+          <p:cNvSpPr>
+            <a:spLocks noGrp="1" noRot="1" noChangeAspect="1"/>
+          </p:cNvSpPr>
+          <p:nvPr>
+            <p:ph type="sldImg" idx="2"/>
+          </p:nvPr>
+        </p:nvSpPr>
+        <p:spPr>
+          <a:xfrm>
+            <a:off x="1371600" y="1143000"/>
+            <a:ext cx="4114800" cy="3086100"/>
+          </a:xfrm>
+          <a:prstGeom prst="rect">
+            <a:avLst/>
+          </a:prstGeom>
+          <a:noFill/>
+          <a:ln w="12700">
+            <a:solidFill>
+              <a:prstClr val="black"/>
+            </a:solidFill>
+          </a:ln>
+        </p:spPr>
+        <p:txBody>
+          <a:bodyPr vert="horz" lIns="91440" tIns="45720" rIns="91440" bIns="45720" rtlCol="0" anchor="ctr"/>
+          <a:lstStyle/>
+          <a:p>
+            <a:endParaRPr lang="en-US"/>
+          </a:p>
+        </p:txBody>
+      </p:sp>
+      <p:sp>
+        <p:nvSpPr>
+          <p:cNvPr id="5" name="Notes Placeholder 4"/>
+          <p:cNvSpPr>
+            <a:spLocks noGrp="1"/>
+          </p:cNvSpPr>
+          <p:nvPr>
+            <p:ph type="body" sz="quarter" idx="3"/>
+          </p:nvPr>
+        </p:nvSpPr>
+        <p:spPr>
+          <a:xfrm>
+            <a:off x="685800" y="4400550"/>
+            <a:ext cx="5486400" cy="3600450"/>
+          </a:xfrm>
+          <a:prstGeom prst="rect">
+            <a:avLst/>
+          </a:prstGeom>
+        </p:spPr>
+        <p:txBody>
+          <a:bodyPr vert="horz" lIns="91440" tIns="45720" rIns="91440" bIns="45720" rtlCol="0"/>
+          <a:lstStyle/>
+          <a:p>
+            <a:pPr lvl="0"/>
+            <a:r>
+              <a:rPr lang="en-US" smtClean="0"/>
+              <a:t>Click to edit Master text styles</a:t>
+            </a:r>
+          </a:p>
+          <a:p>
+            <a:pPr lvl="1"/>
+            <a:r>
+              <a:rPr lang="en-US" smtClean="0"/>
+              <a:t>Second level</a:t>
+            </a:r>
+          </a:p>
+          <a:p>
+            <a:pPr lvl="2"/>
+            <a:r>
+              <a:rPr lang="en-US" smtClean="0"/>
+              <a:t>Third level</a:t>
+            </a:r>
+          </a:p>
+          <a:p>
+            <a:pPr lvl="3"/>
+            <a:r>
+              <a:rPr lang="en-US" smtClean="0"/>
+              <a:t>Fourth level</a:t>
+            </a:r>
+          </a:p>
+          <a:p>
+            <a:pPr lvl="4"/>
+            <a:r>
+              <a:rPr lang="en-US" smtClean="0"/>
+              <a:t>Fifth level</a:t>
+            </a:r>
+            <a:endParaRPr lang="en-US"/>
+          </a:p>
+        </p:txBody>
+      </p:sp>
+      <p:sp>
+        <p:nvSpPr>
+          <p:cNvPr id="6" name="Footer Placeholder 5"/>
+          <p:cNvSpPr>
+            <a:spLocks noGrp="1"/>
+          </p:cNvSpPr>
+          <p:nvPr>
+            <p:ph type="ftr" sz="quarter" idx="4"/>
+          </p:nvPr>
+        </p:nvSpPr>
+        <p:spPr>
+          <a:xfrm>
+            <a:off x="0" y="8685213"/>
+            <a:ext cx="2971800" cy="458787"/>
+          </a:xfrm>
+          <a:prstGeom prst="rect">
+            <a:avLst/>
+          </a:prstGeom>
+        </p:spPr>
+        <p:txBody>
+          <a:bodyPr vert="horz" lIns="91440" tIns="45720" rIns="91440" bIns="45720" rtlCol="0" anchor="b"/>
+          <a:lstStyle>
+            <a:lvl1pPr algn="l">
+              <a:defRPr sz="1200"/>
+            </a:lvl1pPr>
+          </a:lstStyle>
+          <a:p>
+            <a:endParaRPr lang="en-US"/>
+          </a:p>
+        </p:txBody>
+      </p:sp>
+      <p:sp>
+        <p:nvSpPr>
+          <p:cNvPr id="7" name="Slide Number Placeholder 6"/>
+          <p:cNvSpPr>
+            <a:spLocks noGrp="1"/>
+          </p:cNvSpPr>
+          <p:nvPr>
+            <p:ph type="sldNum" sz="quarter" idx="5"/>
+          </p:nvPr>
+        </p:nvSpPr>
+        <p:spPr>
+          <a:xfrm>
+            <a:off x="3884613" y="8685213"/>
+            <a:ext cx="2971800" cy="458787"/>
+          </a:xfrm>
+          <a:prstGeom prst="rect">
+            <a:avLst/>
+          </a:prstGeom>
+        </p:spPr>
+        <p:txBody>
+          <a:bodyPr vert="horz" lIns="91440" tIns="45720" rIns="91440" bIns="45720" rtlCol="0" anchor="b"/>
+          <a:lstStyle>
+            <a:lvl1pPr algn="r">
+              <a:defRPr sz="1200"/>
+            </a:lvl1pPr>
+          </a:lstStyle>
+          <a:p>
+            <a:fld id="{1AF9C123-DD35-4B77-824E-1B24B5F88D5F}" type="slidenum">
+              <a:rPr lang="en-US" smtClean="0"/>
+              <a:t>‹#›</a:t>
+            </a:fld>
+            <a:endParaRPr lang="en-US"/>
+          </a:p>
+        </p:txBody>
+      </p:sp>
+    </p:spTree>
+    <p:extLst>
+      <p:ext uri="{BB962C8B-B14F-4D97-AF65-F5344CB8AC3E}">
+        <p14:creationId xmlns:p14="http://schemas.microsoft.com/office/powerpoint/2010/main" val="770184567"/>
+      </p:ext>
+    </p:extLst>
+  </p:cSld>
+  <p:clrMap bg1="lt1" tx1="dk1" bg2="lt2" tx2="dk2" accent1="accent1" accent2="accent2" accent3="accent3" accent4="accent4" accent5="accent5" accent6="accent6" hlink="hlink" folHlink="folHlink"/>
+  <p:notesStyle>
+    <a:lvl1pPr marL="0" algn="l" defTabSz="914400" rtl="0" eaLnBrk="1" latinLnBrk="0" hangingPunct="1">
+      <a:defRPr sz="1200" kern="1200">
+        <a:solidFill>
+          <a:schemeClr val="tx1"/>
+        </a:solidFill>
+        <a:latin typeface="+mn-lt"/>
+        <a:ea typeface="+mn-ea"/>
+        <a:cs typeface="+mn-cs"/>
+      </a:defRPr>
+    </a:lvl1pPr>
+    <a:lvl2pPr marL="457200" algn="l" defTabSz="914400" rtl="0" eaLnBrk="1" latinLnBrk="0" hangingPunct="1">
+      <a:defRPr sz="1200" kern="1200">
+        <a:solidFill>
+          <a:schemeClr val="tx1"/>
+        </a:solidFill>
+        <a:latin typeface="+mn-lt"/>
+        <a:ea typeface="+mn-ea"/>
+        <a:cs typeface="+mn-cs"/>
+      </a:defRPr>
+    </a:lvl2pPr>
+    <a:lvl3pPr marL="914400" algn="l" defTabSz="914400" rtl="0" eaLnBrk="1" latinLnBrk="0" hangingPunct="1">
+      <a:defRPr sz="1200" kern="1200">
+        <a:solidFill>
+          <a:schemeClr val="tx1"/>
+        </a:solidFill>
+        <a:latin typeface="+mn-lt"/>
+        <a:ea typeface="+mn-ea"/>
+        <a:cs typeface="+mn-cs"/>
+      </a:defRPr>
+    </a:lvl3pPr>
+    <a:lvl4pPr marL="1371600" algn="l" defTabSz="914400" rtl="0" eaLnBrk="1" latinLnBrk="0" hangingPunct="1">
+      <a:defRPr sz="1200" kern="1200">
+        <a:solidFill>
+          <a:schemeClr val="tx1"/>
+        </a:solidFill>
+        <a:latin typeface="+mn-lt"/>
+        <a:ea typeface="+mn-ea"/>
+        <a:cs typeface="+mn-cs"/>
+      </a:defRPr>
+    </a:lvl4pPr>
+    <a:lvl5pPr marL="1828800" algn="l" defTabSz="914400" rtl="0" eaLnBrk="1" latinLnBrk="0" hangingPunct="1">
+      <a:defRPr sz="1200" kern="1200">
+        <a:solidFill>
+          <a:schemeClr val="tx1"/>
+        </a:solidFill>
+        <a:latin typeface="+mn-lt"/>
+        <a:ea typeface="+mn-ea"/>
+        <a:cs typeface="+mn-cs"/>
+      </a:defRPr>
+    </a:lvl5pPr>
+    <a:lvl6pPr marL="2286000" algn="l" defTabSz="914400" rtl="0" eaLnBrk="1" latinLnBrk="0" hangingPunct="1">
+      <a:defRPr sz="1200" kern="1200">
+        <a:solidFill>
+          <a:schemeClr val="tx1"/>
+        </a:solidFill>
+        <a:latin typeface="+mn-lt"/>
+        <a:ea typeface="+mn-ea"/>
+        <a:cs typeface="+mn-cs"/>
+      </a:defRPr>
+    </a:lvl6pPr>
+    <a:lvl7pPr marL="2743200" algn="l" defTabSz="914400" rtl="0" eaLnBrk="1" latinLnBrk="0" hangingPunct="1">
+      <a:defRPr sz="1200" kern="1200">
+        <a:solidFill>
+          <a:schemeClr val="tx1"/>
+        </a:solidFill>
+        <a:latin typeface="+mn-lt"/>
+        <a:ea typeface="+mn-ea"/>
+        <a:cs typeface="+mn-cs"/>
+      </a:defRPr>
+    </a:lvl7pPr>
+    <a:lvl8pPr marL="3200400" algn="l" defTabSz="914400" rtl="0" eaLnBrk="1" latinLnBrk="0" hangingPunct="1">
+      <a:defRPr sz="1200" kern="1200">
+        <a:solidFill>
+          <a:schemeClr val="tx1"/>
+        </a:solidFill>
+        <a:latin typeface="+mn-lt"/>
+        <a:ea typeface="+mn-ea"/>
+        <a:cs typeface="+mn-cs"/>
+      </a:defRPr>
+    </a:lvl8pPr>
+    <a:lvl9pPr marL="3657600" algn="l" defTabSz="914400" rtl="0" eaLnBrk="1" latinLnBrk="0" hangingPunct="1">
+      <a:defRPr sz="1200" kern="1200">
+        <a:solidFill>
+          <a:schemeClr val="tx1"/>
+        </a:solidFill>
+        <a:latin typeface="+mn-lt"/>
+        <a:ea typeface="+mn-ea"/>
+        <a:cs typeface="+mn-cs"/>
+      </a:defRPr>
+    </a:lvl9pPr>
+  </p:notesStyle>
+</p:notesMaster>
+</file>
+
+<file path=ppt/notesSlides/notesSlide1.xml><?xml version="1.0" encoding="utf-8"?>
+<p:notes xmlns:a="http://schemas.openxmlformats.org/drawingml/2006/main" xmlns:r="http://schemas.openxmlformats.org/officeDocument/2006/relationships" xmlns:p="http://schemas.openxmlformats.org/presentationml/2006/main">
+  <p:cSld>
+    <p:spTree>
+      <p:nvGrpSpPr>
+        <p:cNvPr id="1" name=""/>
+        <p:cNvGrpSpPr/>
+        <p:nvPr/>
+      </p:nvGrpSpPr>
+      <p:grpSpPr>
+        <a:xfrm>
+          <a:off x="0" y="0"/>
+          <a:ext cx="0" cy="0"/>
+          <a:chOff x="0" y="0"/>
+          <a:chExt cx="0" cy="0"/>
+        </a:xfrm>
+      </p:grpSpPr>
+      <p:sp>
+        <p:nvSpPr>
+          <p:cNvPr id="2" name="Slide Image Placeholder 1"/>
+          <p:cNvSpPr>
+            <a:spLocks noGrp="1" noRot="1" noChangeAspect="1"/>
+          </p:cNvSpPr>
+          <p:nvPr>
+            <p:ph type="sldImg"/>
+          </p:nvPr>
+        </p:nvSpPr>
+        <p:spPr/>
+      </p:sp>
+      <p:sp>
+        <p:nvSpPr>
+          <p:cNvPr id="3" name="Notes Placeholder 2"/>
+          <p:cNvSpPr>
+            <a:spLocks noGrp="1"/>
+          </p:cNvSpPr>
+          <p:nvPr>
+            <p:ph type="body" idx="1"/>
+          </p:nvPr>
+        </p:nvSpPr>
+        <p:spPr/>
+        <p:txBody>
+          <a:bodyPr/>
+          <a:lstStyle/>
+          <a:p>
+            <a:endParaRPr lang="en-US"/>
+          </a:p>
+        </p:txBody>
+      </p:sp>
+      <p:sp>
+        <p:nvSpPr>
+          <p:cNvPr id="4" name="Slide Number Placeholder 3"/>
+          <p:cNvSpPr>
+            <a:spLocks noGrp="1"/>
+          </p:cNvSpPr>
+          <p:nvPr>
+            <p:ph type="sldNum" sz="quarter" idx="10"/>
+          </p:nvPr>
+        </p:nvSpPr>
+        <p:spPr/>
+        <p:txBody>
+          <a:bodyPr/>
+          <a:lstStyle/>
+          <a:p>
+            <a:fld id="{1AF9C123-DD35-4B77-824E-1B24B5F88D5F}" type="slidenum">
+              <a:rPr lang="en-US" smtClean="0"/>
+              <a:t>7</a:t>
+            </a:fld>
+            <a:endParaRPr lang="en-US"/>
+          </a:p>
+        </p:txBody>
+      </p:sp>
+    </p:spTree>
+    <p:extLst>
+      <p:ext uri="{BB962C8B-B14F-4D97-AF65-F5344CB8AC3E}">
+        <p14:creationId xmlns:p14="http://schemas.microsoft.com/office/powerpoint/2010/main" val="3752411105"/>
+      </p:ext>
+    </p:extLst>
+  </p:cSld>
+  <p:clrMapOvr>
+    <a:masterClrMapping/>
+  </p:clrMapOvr>
+</p:notes>
+</file>
+
 <file path=ppt/slideLayouts/slideLayout1.xml><?xml version="1.0" encoding="utf-8"?>
 <p:sldLayout xmlns:a="http://schemas.openxmlformats.org/drawingml/2006/main" xmlns:r="http://schemas.openxmlformats.org/officeDocument/2006/relationships" xmlns:p="http://schemas.openxmlformats.org/presentationml/2006/main" type="title" preserve="1">
   <p:cSld name="Title Slide">
@@ -9187,7 +9684,7 @@
           <a:p>
             <a:fld id="{8472C7DE-940F-F84D-87FC-CB6C77FFB87A}" type="datetimeFigureOut">
               <a:rPr lang="en-US" smtClean="0"/>
-              <a:t>10/19/16</a:t>
+              <a:t>12/7/2016</a:t>
             </a:fld>
             <a:endParaRPr lang="en-US"/>
           </a:p>
@@ -9357,7 +9854,7 @@
           <a:p>
             <a:fld id="{8472C7DE-940F-F84D-87FC-CB6C77FFB87A}" type="datetimeFigureOut">
               <a:rPr lang="en-US" smtClean="0"/>
-              <a:t>10/19/16</a:t>
+              <a:t>12/7/2016</a:t>
             </a:fld>
             <a:endParaRPr lang="en-US"/>
           </a:p>
@@ -9537,7 +10034,7 @@
           <a:p>
             <a:fld id="{8472C7DE-940F-F84D-87FC-CB6C77FFB87A}" type="datetimeFigureOut">
               <a:rPr lang="en-US" smtClean="0"/>
-              <a:t>10/19/16</a:t>
+              <a:t>12/7/2016</a:t>
             </a:fld>
             <a:endParaRPr lang="en-US"/>
           </a:p>
@@ -9707,7 +10204,7 @@
           <a:p>
             <a:fld id="{8472C7DE-940F-F84D-87FC-CB6C77FFB87A}" type="datetimeFigureOut">
               <a:rPr lang="en-US" smtClean="0"/>
-              <a:t>10/19/16</a:t>
+              <a:t>12/7/2016</a:t>
             </a:fld>
             <a:endParaRPr lang="en-US"/>
           </a:p>
@@ -9951,7 +10448,7 @@
           <a:p>
             <a:fld id="{8472C7DE-940F-F84D-87FC-CB6C77FFB87A}" type="datetimeFigureOut">
               <a:rPr lang="en-US" smtClean="0"/>
-              <a:t>10/19/16</a:t>
+              <a:t>12/7/2016</a:t>
             </a:fld>
             <a:endParaRPr lang="en-US"/>
           </a:p>
@@ -10183,7 +10680,7 @@
           <a:p>
             <a:fld id="{8472C7DE-940F-F84D-87FC-CB6C77FFB87A}" type="datetimeFigureOut">
               <a:rPr lang="en-US" smtClean="0"/>
-              <a:t>10/19/16</a:t>
+              <a:t>12/7/2016</a:t>
             </a:fld>
             <a:endParaRPr lang="en-US"/>
           </a:p>
@@ -10550,7 +11047,7 @@
           <a:p>
             <a:fld id="{8472C7DE-940F-F84D-87FC-CB6C77FFB87A}" type="datetimeFigureOut">
               <a:rPr lang="en-US" smtClean="0"/>
-              <a:t>10/19/16</a:t>
+              <a:t>12/7/2016</a:t>
             </a:fld>
             <a:endParaRPr lang="en-US"/>
           </a:p>
@@ -10668,7 +11165,7 @@
           <a:p>
             <a:fld id="{8472C7DE-940F-F84D-87FC-CB6C77FFB87A}" type="datetimeFigureOut">
               <a:rPr lang="en-US" smtClean="0"/>
-              <a:t>10/19/16</a:t>
+              <a:t>12/7/2016</a:t>
             </a:fld>
             <a:endParaRPr lang="en-US"/>
           </a:p>
@@ -10763,7 +11260,7 @@
           <a:p>
             <a:fld id="{8472C7DE-940F-F84D-87FC-CB6C77FFB87A}" type="datetimeFigureOut">
               <a:rPr lang="en-US" smtClean="0"/>
-              <a:t>10/19/16</a:t>
+              <a:t>12/7/2016</a:t>
             </a:fld>
             <a:endParaRPr lang="en-US"/>
           </a:p>
@@ -11040,7 +11537,7 @@
           <a:p>
             <a:fld id="{8472C7DE-940F-F84D-87FC-CB6C77FFB87A}" type="datetimeFigureOut">
               <a:rPr lang="en-US" smtClean="0"/>
-              <a:t>10/19/16</a:t>
+              <a:t>12/7/2016</a:t>
             </a:fld>
             <a:endParaRPr lang="en-US"/>
           </a:p>
@@ -11297,7 +11794,7 @@
           <a:p>
             <a:fld id="{8472C7DE-940F-F84D-87FC-CB6C77FFB87A}" type="datetimeFigureOut">
               <a:rPr lang="en-US" smtClean="0"/>
-              <a:t>10/19/16</a:t>
+              <a:t>12/7/2016</a:t>
             </a:fld>
             <a:endParaRPr lang="en-US"/>
           </a:p>
@@ -11510,7 +12007,7 @@
           <a:p>
             <a:fld id="{8472C7DE-940F-F84D-87FC-CB6C77FFB87A}" type="datetimeFigureOut">
               <a:rPr lang="en-US" smtClean="0"/>
-              <a:t>10/19/16</a:t>
+              <a:t>12/7/2016</a:t>
             </a:fld>
             <a:endParaRPr lang="en-US"/>
           </a:p>
@@ -12293,8 +12790,13 @@
             <a:avLst/>
           </a:prstGeom>
           <a:solidFill>
-            <a:srgbClr val="000046"/>
+            <a:srgbClr val="FFC000"/>
           </a:solidFill>
+          <a:ln>
+            <a:solidFill>
+              <a:schemeClr val="bg1"/>
+            </a:solidFill>
+          </a:ln>
           <a:effectLst>
             <a:outerShdw blurRad="50800" dist="25400" dir="5400000" algn="ctr" rotWithShape="0">
               <a:schemeClr val="tx2">
@@ -12325,10 +12827,18 @@
           <a:p>
             <a:pPr algn="ctr"/>
             <a:r>
-              <a:rPr lang="en-US" dirty="0" smtClean="0"/>
+              <a:rPr lang="en-US" dirty="0" smtClean="0">
+                <a:solidFill>
+                  <a:srgbClr val="000066"/>
+                </a:solidFill>
+              </a:rPr>
               <a:t>Back</a:t>
             </a:r>
-            <a:endParaRPr lang="en-US" dirty="0"/>
+            <a:endParaRPr lang="en-US" dirty="0">
+              <a:solidFill>
+                <a:srgbClr val="000066"/>
+              </a:solidFill>
+            </a:endParaRPr>
           </a:p>
         </p:txBody>
       </p:sp>
@@ -12349,8 +12859,13 @@
             <a:avLst/>
           </a:prstGeom>
           <a:solidFill>
-            <a:srgbClr val="000046"/>
+            <a:srgbClr val="548235"/>
           </a:solidFill>
+          <a:ln>
+            <a:solidFill>
+              <a:schemeClr val="bg1"/>
+            </a:solidFill>
+          </a:ln>
           <a:effectLst>
             <a:outerShdw blurRad="50800" dist="25400" dir="5400000" algn="ctr" rotWithShape="0">
               <a:schemeClr val="tx2">
@@ -12892,8 +13407,13 @@
             <a:avLst/>
           </a:prstGeom>
           <a:solidFill>
-            <a:srgbClr val="000046"/>
+            <a:srgbClr val="C00000"/>
           </a:solidFill>
+          <a:ln>
+            <a:solidFill>
+              <a:schemeClr val="bg1"/>
+            </a:solidFill>
+          </a:ln>
           <a:effectLst>
             <a:outerShdw blurRad="50800" dist="25400" dir="5400000" algn="ctr" rotWithShape="0">
               <a:schemeClr val="tx2">
@@ -13036,6 +13556,13 @@
   <p:clrMapOvr>
     <a:masterClrMapping/>
   </p:clrMapOvr>
+  <p:timing>
+    <p:tnLst>
+      <p:par>
+        <p:cTn id="1" dur="indefinite" restart="never" nodeType="tmRoot"/>
+      </p:par>
+    </p:tnLst>
+  </p:timing>
 </p:sld>
 </file>
 
@@ -13159,8 +13686,13 @@
             <a:avLst/>
           </a:prstGeom>
           <a:solidFill>
-            <a:srgbClr val="000046"/>
+            <a:srgbClr val="FFC000"/>
           </a:solidFill>
+          <a:ln>
+            <a:solidFill>
+              <a:schemeClr val="bg1"/>
+            </a:solidFill>
+          </a:ln>
           <a:effectLst>
             <a:outerShdw blurRad="50800" dist="25400" dir="5400000" algn="ctr" rotWithShape="0">
               <a:schemeClr val="tx2">
@@ -13191,10 +13723,18 @@
           <a:p>
             <a:pPr algn="ctr"/>
             <a:r>
-              <a:rPr lang="en-US" dirty="0" smtClean="0"/>
+              <a:rPr lang="en-US" dirty="0" smtClean="0">
+                <a:solidFill>
+                  <a:srgbClr val="000066"/>
+                </a:solidFill>
+              </a:rPr>
               <a:t>Back</a:t>
             </a:r>
-            <a:endParaRPr lang="en-US" dirty="0"/>
+            <a:endParaRPr lang="en-US" dirty="0">
+              <a:solidFill>
+                <a:srgbClr val="000066"/>
+              </a:solidFill>
+            </a:endParaRPr>
           </a:p>
         </p:txBody>
       </p:sp>
@@ -13215,8 +13755,13 @@
             <a:avLst/>
           </a:prstGeom>
           <a:solidFill>
-            <a:srgbClr val="000046"/>
+            <a:srgbClr val="548235"/>
           </a:solidFill>
+          <a:ln>
+            <a:solidFill>
+              <a:schemeClr val="bg1"/>
+            </a:solidFill>
+          </a:ln>
           <a:effectLst>
             <a:outerShdw blurRad="50800" dist="25400" dir="5400000" algn="ctr" rotWithShape="0">
               <a:schemeClr val="tx2">
@@ -13657,8 +14202,13 @@
             <a:avLst/>
           </a:prstGeom>
           <a:solidFill>
-            <a:srgbClr val="000046"/>
+            <a:srgbClr val="C00000"/>
           </a:solidFill>
+          <a:ln>
+            <a:solidFill>
+              <a:schemeClr val="bg1"/>
+            </a:solidFill>
+          </a:ln>
           <a:effectLst>
             <a:outerShdw blurRad="50800" dist="25400" dir="5400000" algn="ctr" rotWithShape="0">
               <a:schemeClr val="tx2">
@@ -13944,6 +14494,13 @@
   <p:clrMapOvr>
     <a:masterClrMapping/>
   </p:clrMapOvr>
+  <p:timing>
+    <p:tnLst>
+      <p:par>
+        <p:cTn id="1" dur="indefinite" restart="never" nodeType="tmRoot"/>
+      </p:par>
+    </p:tnLst>
+  </p:timing>
 </p:sld>
 </file>
 
@@ -14067,8 +14624,13 @@
             <a:avLst/>
           </a:prstGeom>
           <a:solidFill>
-            <a:srgbClr val="000046"/>
+            <a:srgbClr val="FFC000"/>
           </a:solidFill>
+          <a:ln>
+            <a:solidFill>
+              <a:schemeClr val="bg1"/>
+            </a:solidFill>
+          </a:ln>
           <a:effectLst>
             <a:outerShdw blurRad="50800" dist="25400" dir="5400000" algn="ctr" rotWithShape="0">
               <a:schemeClr val="tx2">
@@ -14099,10 +14661,18 @@
           <a:p>
             <a:pPr algn="ctr"/>
             <a:r>
-              <a:rPr lang="en-US" dirty="0" smtClean="0"/>
+              <a:rPr lang="en-US" dirty="0" smtClean="0">
+                <a:solidFill>
+                  <a:srgbClr val="000066"/>
+                </a:solidFill>
+              </a:rPr>
               <a:t>Back</a:t>
             </a:r>
-            <a:endParaRPr lang="en-US" dirty="0"/>
+            <a:endParaRPr lang="en-US" dirty="0">
+              <a:solidFill>
+                <a:srgbClr val="000066"/>
+              </a:solidFill>
+            </a:endParaRPr>
           </a:p>
         </p:txBody>
       </p:sp>
@@ -14123,8 +14693,13 @@
             <a:avLst/>
           </a:prstGeom>
           <a:solidFill>
-            <a:srgbClr val="000046"/>
+            <a:srgbClr val="548235"/>
           </a:solidFill>
+          <a:ln>
+            <a:solidFill>
+              <a:schemeClr val="bg1"/>
+            </a:solidFill>
+          </a:ln>
           <a:effectLst>
             <a:outerShdw blurRad="50800" dist="25400" dir="5400000" algn="ctr" rotWithShape="0">
               <a:schemeClr val="tx2">
@@ -14565,8 +15140,13 @@
             <a:avLst/>
           </a:prstGeom>
           <a:solidFill>
-            <a:srgbClr val="000046"/>
+            <a:srgbClr val="C00000"/>
           </a:solidFill>
+          <a:ln>
+            <a:solidFill>
+              <a:schemeClr val="bg1"/>
+            </a:solidFill>
+          </a:ln>
           <a:effectLst>
             <a:outerShdw blurRad="50800" dist="25400" dir="5400000" algn="ctr" rotWithShape="0">
               <a:schemeClr val="tx2">
@@ -14852,6 +15432,13 @@
   <p:clrMapOvr>
     <a:masterClrMapping/>
   </p:clrMapOvr>
+  <p:timing>
+    <p:tnLst>
+      <p:par>
+        <p:cTn id="1" dur="indefinite" restart="never" nodeType="tmRoot"/>
+      </p:par>
+    </p:tnLst>
+  </p:timing>
 </p:sld>
 </file>
 
@@ -14975,8 +15562,13 @@
             <a:avLst/>
           </a:prstGeom>
           <a:solidFill>
-            <a:srgbClr val="000046"/>
+            <a:srgbClr val="FFC000"/>
           </a:solidFill>
+          <a:ln>
+            <a:solidFill>
+              <a:schemeClr val="bg1"/>
+            </a:solidFill>
+          </a:ln>
           <a:effectLst>
             <a:outerShdw blurRad="50800" dist="25400" dir="5400000" algn="ctr" rotWithShape="0">
               <a:schemeClr val="tx2">
@@ -15007,10 +15599,18 @@
           <a:p>
             <a:pPr algn="ctr"/>
             <a:r>
-              <a:rPr lang="en-US" dirty="0" smtClean="0"/>
+              <a:rPr lang="en-US" dirty="0" smtClean="0">
+                <a:solidFill>
+                  <a:srgbClr val="000066"/>
+                </a:solidFill>
+              </a:rPr>
               <a:t>Back</a:t>
             </a:r>
-            <a:endParaRPr lang="en-US" dirty="0"/>
+            <a:endParaRPr lang="en-US" dirty="0">
+              <a:solidFill>
+                <a:srgbClr val="000066"/>
+              </a:solidFill>
+            </a:endParaRPr>
           </a:p>
         </p:txBody>
       </p:sp>
@@ -15402,8 +16002,13 @@
             <a:avLst/>
           </a:prstGeom>
           <a:solidFill>
-            <a:srgbClr val="000046"/>
+            <a:srgbClr val="C00000"/>
           </a:solidFill>
+          <a:ln>
+            <a:solidFill>
+              <a:schemeClr val="bg1"/>
+            </a:solidFill>
+          </a:ln>
           <a:effectLst>
             <a:outerShdw blurRad="50800" dist="25400" dir="5400000" algn="ctr" rotWithShape="0">
               <a:schemeClr val="tx2">
@@ -15689,6 +16294,13 @@
   <p:clrMapOvr>
     <a:masterClrMapping/>
   </p:clrMapOvr>
+  <p:timing>
+    <p:tnLst>
+      <p:par>
+        <p:cTn id="1" dur="indefinite" restart="never" nodeType="tmRoot"/>
+      </p:par>
+    </p:tnLst>
+  </p:timing>
 </p:sld>
 </file>
 
@@ -16571,7 +17183,15 @@
               </a:pPr>
               <a:r>
                 <a:rPr lang="en-US" sz="1500" kern="1200" dirty="0" smtClean="0"/>
-                <a:t>ActiveNet is full of features to help us accomplish everyday tasks. From Course Registrations, Facility Reservations and Customer Organization to Lagoon Permits, Point of Sale Procedures and Sports Leagues, we use this imperative system in a meaningful manner. </a:t>
+                <a:t>ActiveNet is full of features to help us accomplish everyday tasks. From Course Registrations, Facility Reservations and Customer Organization to Lagoon Permits, Point of Sale Procedures and Sports Leagues, we use this </a:t>
+              </a:r>
+              <a:r>
+                <a:rPr lang="en-US" sz="1500" kern="1200" dirty="0" smtClean="0"/>
+                <a:t>important </a:t>
+              </a:r>
+              <a:r>
+                <a:rPr lang="en-US" sz="1500" kern="1200" dirty="0" smtClean="0"/>
+                <a:t>system in a meaningful manner. </a:t>
               </a:r>
               <a:endParaRPr lang="en-US" sz="1500" kern="1200" dirty="0"/>
             </a:p>
@@ -17042,8 +17662,13 @@
             <a:avLst/>
           </a:prstGeom>
           <a:solidFill>
-            <a:srgbClr val="000046"/>
+            <a:srgbClr val="548235"/>
           </a:solidFill>
+          <a:ln>
+            <a:solidFill>
+              <a:schemeClr val="bg1"/>
+            </a:solidFill>
+          </a:ln>
           <a:effectLst>
             <a:outerShdw blurRad="50800" dist="25400" dir="5400000" algn="ctr" rotWithShape="0">
               <a:schemeClr val="tx2">
@@ -17320,8 +17945,13 @@
             <a:avLst/>
           </a:prstGeom>
           <a:solidFill>
-            <a:srgbClr val="000046"/>
+            <a:srgbClr val="548235"/>
           </a:solidFill>
+          <a:ln>
+            <a:solidFill>
+              <a:schemeClr val="bg1"/>
+            </a:solidFill>
+          </a:ln>
           <a:effectLst>
             <a:outerShdw blurRad="50800" dist="25400" dir="5400000" algn="ctr" rotWithShape="0">
               <a:schemeClr val="tx2">
@@ -17376,8 +18006,13 @@
             <a:avLst/>
           </a:prstGeom>
           <a:solidFill>
-            <a:srgbClr val="000046"/>
+            <a:srgbClr val="FFC000"/>
           </a:solidFill>
+          <a:ln>
+            <a:solidFill>
+              <a:schemeClr val="bg1"/>
+            </a:solidFill>
+          </a:ln>
           <a:effectLst>
             <a:outerShdw blurRad="50800" dist="25400" dir="5400000" algn="ctr" rotWithShape="0">
               <a:schemeClr val="tx2">
@@ -17408,10 +18043,18 @@
           <a:p>
             <a:pPr algn="ctr"/>
             <a:r>
-              <a:rPr lang="en-US" dirty="0" smtClean="0"/>
+              <a:rPr lang="en-US" dirty="0" smtClean="0">
+                <a:solidFill>
+                  <a:srgbClr val="000066"/>
+                </a:solidFill>
+              </a:rPr>
               <a:t>Back</a:t>
             </a:r>
-            <a:endParaRPr lang="en-US" dirty="0"/>
+            <a:endParaRPr lang="en-US" dirty="0">
+              <a:solidFill>
+                <a:srgbClr val="000066"/>
+              </a:solidFill>
+            </a:endParaRPr>
           </a:p>
         </p:txBody>
       </p:sp>
@@ -18530,8 +19173,13 @@
             <a:avLst/>
           </a:prstGeom>
           <a:solidFill>
-            <a:srgbClr val="000046"/>
+            <a:srgbClr val="548235"/>
           </a:solidFill>
+          <a:ln>
+            <a:solidFill>
+              <a:schemeClr val="bg1"/>
+            </a:solidFill>
+          </a:ln>
           <a:effectLst>
             <a:outerShdw blurRad="50800" dist="25400" dir="5400000" algn="ctr" rotWithShape="0">
               <a:schemeClr val="tx2">
@@ -18586,8 +19234,13 @@
             <a:avLst/>
           </a:prstGeom>
           <a:solidFill>
-            <a:srgbClr val="000046"/>
+            <a:srgbClr val="FFC000"/>
           </a:solidFill>
+          <a:ln>
+            <a:solidFill>
+              <a:schemeClr val="bg1"/>
+            </a:solidFill>
+          </a:ln>
           <a:effectLst>
             <a:outerShdw blurRad="50800" dist="25400" dir="5400000" algn="ctr" rotWithShape="0">
               <a:schemeClr val="tx2">
@@ -18618,10 +19271,18 @@
           <a:p>
             <a:pPr algn="ctr"/>
             <a:r>
-              <a:rPr lang="en-US" dirty="0" smtClean="0"/>
+              <a:rPr lang="en-US" dirty="0" smtClean="0">
+                <a:solidFill>
+                  <a:srgbClr val="000066"/>
+                </a:solidFill>
+              </a:rPr>
               <a:t>Back</a:t>
             </a:r>
-            <a:endParaRPr lang="en-US" dirty="0"/>
+            <a:endParaRPr lang="en-US" dirty="0">
+              <a:solidFill>
+                <a:srgbClr val="000066"/>
+              </a:solidFill>
+            </a:endParaRPr>
           </a:p>
         </p:txBody>
       </p:sp>
@@ -18785,48 +19446,75 @@
             <a:p>
               <a:pPr algn="ctr"/>
               <a:r>
-                <a:rPr lang="en-US" sz="1200" dirty="0" smtClean="0"/>
+                <a:rPr lang="en-US" sz="1400" b="1" dirty="0" smtClean="0">
+                  <a:solidFill>
+                    <a:srgbClr val="FFFF00"/>
+                  </a:solidFill>
+                </a:rPr>
                 <a:t>On ActiveNet, </a:t>
               </a:r>
-              <a:endParaRPr lang="en-US" sz="1200" dirty="0" smtClean="0"/>
             </a:p>
             <a:p>
               <a:pPr algn="ctr"/>
               <a:r>
-                <a:rPr lang="en-US" sz="1200" dirty="0" smtClean="0"/>
-                <a:t>Blue </a:t>
+                <a:rPr lang="en-US" sz="1400" b="1" dirty="0" smtClean="0">
+                  <a:solidFill>
+                    <a:srgbClr val="FFFF00"/>
+                  </a:solidFill>
+                </a:rPr>
+                <a:t>Blue means </a:t>
               </a:r>
               <a:r>
-                <a:rPr lang="en-US" sz="1200" dirty="0" smtClean="0"/>
-                <a:t>means </a:t>
-              </a:r>
-              <a:r>
-                <a:rPr lang="en-US" sz="1200" b="1" i="1" dirty="0" smtClean="0"/>
+                <a:rPr lang="en-US" sz="1400" b="1" i="1" dirty="0" smtClean="0">
+                  <a:solidFill>
+                    <a:srgbClr val="FFFF00"/>
+                  </a:solidFill>
+                </a:rPr>
                 <a:t>Live</a:t>
               </a:r>
               <a:r>
-                <a:rPr lang="en-US" sz="1200" dirty="0" smtClean="0"/>
+                <a:rPr lang="en-US" sz="1400" b="1" dirty="0" smtClean="0">
+                  <a:solidFill>
+                    <a:srgbClr val="FFFF00"/>
+                  </a:solidFill>
+                </a:rPr>
                 <a:t> </a:t>
               </a:r>
             </a:p>
             <a:p>
               <a:pPr algn="ctr"/>
               <a:r>
-                <a:rPr lang="en-US" sz="1200" dirty="0" smtClean="0"/>
+                <a:rPr lang="en-US" sz="1400" b="1" dirty="0" smtClean="0">
+                  <a:solidFill>
+                    <a:srgbClr val="FFFF00"/>
+                  </a:solidFill>
+                </a:rPr>
                 <a:t>while </a:t>
               </a:r>
             </a:p>
             <a:p>
               <a:pPr algn="ctr"/>
               <a:r>
-                <a:rPr lang="en-US" sz="1200" dirty="0" smtClean="0"/>
+                <a:rPr lang="en-US" sz="1400" b="1" dirty="0" smtClean="0">
+                  <a:solidFill>
+                    <a:srgbClr val="FFFF00"/>
+                  </a:solidFill>
+                </a:rPr>
                 <a:t>Yellow means </a:t>
               </a:r>
               <a:r>
-                <a:rPr lang="en-US" sz="1200" b="1" i="1" dirty="0" smtClean="0"/>
+                <a:rPr lang="en-US" sz="1400" b="1" i="1" dirty="0" smtClean="0">
+                  <a:solidFill>
+                    <a:srgbClr val="FFFF00"/>
+                  </a:solidFill>
+                </a:rPr>
                 <a:t>Trainer</a:t>
               </a:r>
-              <a:endParaRPr lang="en-US" sz="1200" b="1" i="1" dirty="0"/>
+              <a:endParaRPr lang="en-US" sz="1400" b="1" i="1" dirty="0">
+                <a:solidFill>
+                  <a:srgbClr val="FFFF00"/>
+                </a:solidFill>
+              </a:endParaRPr>
             </a:p>
           </p:txBody>
         </p:sp>
@@ -18958,7 +19646,7 @@
             <p:nvPr/>
           </p:nvPicPr>
           <p:blipFill>
-            <a:blip r:embed="rId2">
+            <a:blip r:embed="rId3">
               <a:extLst>
                 <a:ext uri="{28A0092B-C50C-407E-A947-70E740481C1C}">
                   <a14:useLocalDpi xmlns:a14="http://schemas.microsoft.com/office/drawing/2010/main" val="0"/>
@@ -19138,8 +19826,13 @@
             <a:avLst/>
           </a:prstGeom>
           <a:solidFill>
-            <a:srgbClr val="000046"/>
+            <a:srgbClr val="548235"/>
           </a:solidFill>
+          <a:ln>
+            <a:solidFill>
+              <a:schemeClr val="bg1"/>
+            </a:solidFill>
+          </a:ln>
           <a:effectLst>
             <a:outerShdw blurRad="50800" dist="25400" dir="5400000" algn="ctr" rotWithShape="0">
               <a:schemeClr val="tx2">
@@ -19180,7 +19873,7 @@
       <p:sp>
         <p:nvSpPr>
           <p:cNvPr id="21" name="Rounded Rectangle 20">
-            <a:hlinkClick r:id="rId3" action="ppaction://hlinksldjump"/>
+            <a:hlinkClick r:id="rId4" action="ppaction://hlinksldjump"/>
           </p:cNvPr>
           <p:cNvSpPr/>
           <p:nvPr/>
@@ -19194,8 +19887,13 @@
             <a:avLst/>
           </a:prstGeom>
           <a:solidFill>
-            <a:srgbClr val="000046"/>
+            <a:srgbClr val="FFC000"/>
           </a:solidFill>
+          <a:ln>
+            <a:solidFill>
+              <a:schemeClr val="bg1"/>
+            </a:solidFill>
+          </a:ln>
           <a:effectLst>
             <a:outerShdw blurRad="50800" dist="25400" dir="5400000" algn="ctr" rotWithShape="0">
               <a:schemeClr val="tx2">
@@ -19226,10 +19924,18 @@
           <a:p>
             <a:pPr algn="ctr"/>
             <a:r>
-              <a:rPr lang="en-US" dirty="0" smtClean="0"/>
+              <a:rPr lang="en-US" dirty="0" smtClean="0">
+                <a:solidFill>
+                  <a:srgbClr val="000066"/>
+                </a:solidFill>
+              </a:rPr>
               <a:t>Back</a:t>
             </a:r>
-            <a:endParaRPr lang="en-US" dirty="0"/>
+            <a:endParaRPr lang="en-US" dirty="0">
+              <a:solidFill>
+                <a:srgbClr val="000066"/>
+              </a:solidFill>
+            </a:endParaRPr>
           </a:p>
         </p:txBody>
       </p:sp>
@@ -19240,7 +19946,7 @@
           <p:nvPr>
             <p:extLst>
               <p:ext uri="{D42A27DB-BD31-4B8C-83A1-F6EECF244321}">
-                <p14:modId xmlns:p14="http://schemas.microsoft.com/office/powerpoint/2010/main" val="1520713666"/>
+                <p14:modId xmlns:p14="http://schemas.microsoft.com/office/powerpoint/2010/main" val="1850958083"/>
               </p:ext>
             </p:extLst>
           </p:nvPr>
@@ -19251,7 +19957,7 @@
         </p:xfrm>
         <a:graphic>
           <a:graphicData uri="http://schemas.openxmlformats.org/drawingml/2006/diagram">
-            <dgm:relIds xmlns:dgm="http://schemas.openxmlformats.org/drawingml/2006/diagram" xmlns:r="http://schemas.openxmlformats.org/officeDocument/2006/relationships" r:dm="rId4" r:lo="rId5" r:qs="rId6" r:cs="rId7"/>
+            <dgm:relIds xmlns:dgm="http://schemas.openxmlformats.org/drawingml/2006/diagram" xmlns:r="http://schemas.openxmlformats.org/officeDocument/2006/relationships" r:dm="rId5" r:lo="rId6" r:qs="rId7" r:cs="rId8"/>
           </a:graphicData>
         </a:graphic>
       </p:graphicFrame>
@@ -19495,8 +20201,13 @@
             <a:avLst/>
           </a:prstGeom>
           <a:solidFill>
-            <a:srgbClr val="000046"/>
+            <a:srgbClr val="548235"/>
           </a:solidFill>
+          <a:ln>
+            <a:solidFill>
+              <a:schemeClr val="bg1"/>
+            </a:solidFill>
+          </a:ln>
           <a:effectLst>
             <a:outerShdw blurRad="50800" dist="25400" dir="5400000" algn="ctr" rotWithShape="0">
               <a:schemeClr val="tx2">
@@ -19551,8 +20262,13 @@
             <a:avLst/>
           </a:prstGeom>
           <a:solidFill>
-            <a:srgbClr val="000046"/>
+            <a:srgbClr val="FFC000"/>
           </a:solidFill>
+          <a:ln>
+            <a:solidFill>
+              <a:schemeClr val="bg1"/>
+            </a:solidFill>
+          </a:ln>
           <a:effectLst>
             <a:outerShdw blurRad="50800" dist="25400" dir="5400000" algn="ctr" rotWithShape="0">
               <a:schemeClr val="tx2">
@@ -19583,10 +20299,18 @@
           <a:p>
             <a:pPr algn="ctr"/>
             <a:r>
-              <a:rPr lang="en-US" dirty="0" smtClean="0"/>
+              <a:rPr lang="en-US" dirty="0" smtClean="0">
+                <a:solidFill>
+                  <a:srgbClr val="000066"/>
+                </a:solidFill>
+              </a:rPr>
               <a:t>Back</a:t>
             </a:r>
-            <a:endParaRPr lang="en-US" dirty="0"/>
+            <a:endParaRPr lang="en-US" dirty="0">
+              <a:solidFill>
+                <a:srgbClr val="000066"/>
+              </a:solidFill>
+            </a:endParaRPr>
           </a:p>
         </p:txBody>
       </p:sp>
@@ -19597,7 +20321,7 @@
           <p:nvPr>
             <p:extLst>
               <p:ext uri="{D42A27DB-BD31-4B8C-83A1-F6EECF244321}">
-                <p14:modId xmlns:p14="http://schemas.microsoft.com/office/powerpoint/2010/main" val="1660963907"/>
+                <p14:modId xmlns:p14="http://schemas.microsoft.com/office/powerpoint/2010/main" val="2726051553"/>
               </p:ext>
             </p:extLst>
           </p:nvPr>
@@ -19852,8 +20576,13 @@
             <a:avLst/>
           </a:prstGeom>
           <a:solidFill>
-            <a:srgbClr val="000046"/>
+            <a:srgbClr val="FFC000"/>
           </a:solidFill>
+          <a:ln>
+            <a:solidFill>
+              <a:schemeClr val="bg1"/>
+            </a:solidFill>
+          </a:ln>
           <a:effectLst>
             <a:outerShdw blurRad="50800" dist="25400" dir="5400000" algn="ctr" rotWithShape="0">
               <a:schemeClr val="tx2">
@@ -19884,10 +20613,18 @@
           <a:p>
             <a:pPr algn="ctr"/>
             <a:r>
-              <a:rPr lang="en-US" dirty="0" smtClean="0"/>
+              <a:rPr lang="en-US" dirty="0" smtClean="0">
+                <a:solidFill>
+                  <a:srgbClr val="000066"/>
+                </a:solidFill>
+              </a:rPr>
               <a:t>Back</a:t>
             </a:r>
-            <a:endParaRPr lang="en-US" dirty="0"/>
+            <a:endParaRPr lang="en-US" dirty="0">
+              <a:solidFill>
+                <a:srgbClr val="000066"/>
+              </a:solidFill>
+            </a:endParaRPr>
           </a:p>
         </p:txBody>
       </p:sp>
@@ -19930,8 +20667,13 @@
             <a:avLst/>
           </a:prstGeom>
           <a:solidFill>
-            <a:srgbClr val="000046"/>
+            <a:srgbClr val="548235"/>
           </a:solidFill>
+          <a:ln>
+            <a:solidFill>
+              <a:schemeClr val="bg1"/>
+            </a:solidFill>
+          </a:ln>
           <a:effectLst>
             <a:outerShdw blurRad="50800" dist="25400" dir="5400000" algn="ctr" rotWithShape="0">
               <a:schemeClr val="tx2">
@@ -20391,4 +21133,265 @@
     </a:ext>
   </a:extLst>
 </a:theme>
+</file>
+
+<file path=ppt/theme/theme2.xml><?xml version="1.0" encoding="utf-8"?>
+<a:theme xmlns:a="http://schemas.openxmlformats.org/drawingml/2006/main" name="Office Theme">
+  <a:themeElements>
+    <a:clrScheme name="Office">
+      <a:dk1>
+        <a:sysClr val="windowText" lastClr="000000"/>
+      </a:dk1>
+      <a:lt1>
+        <a:sysClr val="window" lastClr="FFFFFF"/>
+      </a:lt1>
+      <a:dk2>
+        <a:srgbClr val="44546A"/>
+      </a:dk2>
+      <a:lt2>
+        <a:srgbClr val="E7E6E6"/>
+      </a:lt2>
+      <a:accent1>
+        <a:srgbClr val="5B9BD5"/>
+      </a:accent1>
+      <a:accent2>
+        <a:srgbClr val="ED7D31"/>
+      </a:accent2>
+      <a:accent3>
+        <a:srgbClr val="A5A5A5"/>
+      </a:accent3>
+      <a:accent4>
+        <a:srgbClr val="FFC000"/>
+      </a:accent4>
+      <a:accent5>
+        <a:srgbClr val="4472C4"/>
+      </a:accent5>
+      <a:accent6>
+        <a:srgbClr val="70AD47"/>
+      </a:accent6>
+      <a:hlink>
+        <a:srgbClr val="0563C1"/>
+      </a:hlink>
+      <a:folHlink>
+        <a:srgbClr val="954F72"/>
+      </a:folHlink>
+    </a:clrScheme>
+    <a:fontScheme name="Office">
+      <a:majorFont>
+        <a:latin typeface="Calibri Light" panose="020F0302020204030204"/>
+        <a:ea typeface=""/>
+        <a:cs typeface=""/>
+        <a:font script="Jpan" typeface="ＭＳ Ｐゴシック"/>
+        <a:font script="Hang" typeface="맑은 고딕"/>
+        <a:font script="Hans" typeface="宋体"/>
+        <a:font script="Hant" typeface="新細明體"/>
+        <a:font script="Arab" typeface="Times New Roman"/>
+        <a:font script="Hebr" typeface="Times New Roman"/>
+        <a:font script="Thai" typeface="Angsana New"/>
+        <a:font script="Ethi" typeface="Nyala"/>
+        <a:font script="Beng" typeface="Vrinda"/>
+        <a:font script="Gujr" typeface="Shruti"/>
+        <a:font script="Khmr" typeface="MoolBoran"/>
+        <a:font script="Knda" typeface="Tunga"/>
+        <a:font script="Guru" typeface="Raavi"/>
+        <a:font script="Cans" typeface="Euphemia"/>
+        <a:font script="Cher" typeface="Plantagenet Cherokee"/>
+        <a:font script="Yiii" typeface="Microsoft Yi Baiti"/>
+        <a:font script="Tibt" typeface="Microsoft Himalaya"/>
+        <a:font script="Thaa" typeface="MV Boli"/>
+        <a:font script="Deva" typeface="Mangal"/>
+        <a:font script="Telu" typeface="Gautami"/>
+        <a:font script="Taml" typeface="Latha"/>
+        <a:font script="Syrc" typeface="Estrangelo Edessa"/>
+        <a:font script="Orya" typeface="Kalinga"/>
+        <a:font script="Mlym" typeface="Kartika"/>
+        <a:font script="Laoo" typeface="DokChampa"/>
+        <a:font script="Sinh" typeface="Iskoola Pota"/>
+        <a:font script="Mong" typeface="Mongolian Baiti"/>
+        <a:font script="Viet" typeface="Times New Roman"/>
+        <a:font script="Uigh" typeface="Microsoft Uighur"/>
+        <a:font script="Geor" typeface="Sylfaen"/>
+      </a:majorFont>
+      <a:minorFont>
+        <a:latin typeface="Calibri" panose="020F0502020204030204"/>
+        <a:ea typeface=""/>
+        <a:cs typeface=""/>
+        <a:font script="Jpan" typeface="ＭＳ Ｐゴシック"/>
+        <a:font script="Hang" typeface="맑은 고딕"/>
+        <a:font script="Hans" typeface="宋体"/>
+        <a:font script="Hant" typeface="新細明體"/>
+        <a:font script="Arab" typeface="Arial"/>
+        <a:font script="Hebr" typeface="Arial"/>
+        <a:font script="Thai" typeface="Cordia New"/>
+        <a:font script="Ethi" typeface="Nyala"/>
+        <a:font script="Beng" typeface="Vrinda"/>
+        <a:font script="Gujr" typeface="Shruti"/>
+        <a:font script="Khmr" typeface="DaunPenh"/>
+        <a:font script="Knda" typeface="Tunga"/>
+        <a:font script="Guru" typeface="Raavi"/>
+        <a:font script="Cans" typeface="Euphemia"/>
+        <a:font script="Cher" typeface="Plantagenet Cherokee"/>
+        <a:font script="Yiii" typeface="Microsoft Yi Baiti"/>
+        <a:font script="Tibt" typeface="Microsoft Himalaya"/>
+        <a:font script="Thaa" typeface="MV Boli"/>
+        <a:font script="Deva" typeface="Mangal"/>
+        <a:font script="Telu" typeface="Gautami"/>
+        <a:font script="Taml" typeface="Latha"/>
+        <a:font script="Syrc" typeface="Estrangelo Edessa"/>
+        <a:font script="Orya" typeface="Kalinga"/>
+        <a:font script="Mlym" typeface="Kartika"/>
+        <a:font script="Laoo" typeface="DokChampa"/>
+        <a:font script="Sinh" typeface="Iskoola Pota"/>
+        <a:font script="Mong" typeface="Mongolian Baiti"/>
+        <a:font script="Viet" typeface="Arial"/>
+        <a:font script="Uigh" typeface="Microsoft Uighur"/>
+        <a:font script="Geor" typeface="Sylfaen"/>
+      </a:minorFont>
+    </a:fontScheme>
+    <a:fmtScheme name="Office">
+      <a:fillStyleLst>
+        <a:solidFill>
+          <a:schemeClr val="phClr"/>
+        </a:solidFill>
+        <a:gradFill rotWithShape="1">
+          <a:gsLst>
+            <a:gs pos="0">
+              <a:schemeClr val="phClr">
+                <a:lumMod val="110000"/>
+                <a:satMod val="105000"/>
+                <a:tint val="67000"/>
+              </a:schemeClr>
+            </a:gs>
+            <a:gs pos="50000">
+              <a:schemeClr val="phClr">
+                <a:lumMod val="105000"/>
+                <a:satMod val="103000"/>
+                <a:tint val="73000"/>
+              </a:schemeClr>
+            </a:gs>
+            <a:gs pos="100000">
+              <a:schemeClr val="phClr">
+                <a:lumMod val="105000"/>
+                <a:satMod val="109000"/>
+                <a:tint val="81000"/>
+              </a:schemeClr>
+            </a:gs>
+          </a:gsLst>
+          <a:lin ang="5400000" scaled="0"/>
+        </a:gradFill>
+        <a:gradFill rotWithShape="1">
+          <a:gsLst>
+            <a:gs pos="0">
+              <a:schemeClr val="phClr">
+                <a:satMod val="103000"/>
+                <a:lumMod val="102000"/>
+                <a:tint val="94000"/>
+              </a:schemeClr>
+            </a:gs>
+            <a:gs pos="50000">
+              <a:schemeClr val="phClr">
+                <a:satMod val="110000"/>
+                <a:lumMod val="100000"/>
+                <a:shade val="100000"/>
+              </a:schemeClr>
+            </a:gs>
+            <a:gs pos="100000">
+              <a:schemeClr val="phClr">
+                <a:lumMod val="99000"/>
+                <a:satMod val="120000"/>
+                <a:shade val="78000"/>
+              </a:schemeClr>
+            </a:gs>
+          </a:gsLst>
+          <a:lin ang="5400000" scaled="0"/>
+        </a:gradFill>
+      </a:fillStyleLst>
+      <a:lnStyleLst>
+        <a:ln w="6350" cap="flat" cmpd="sng" algn="ctr">
+          <a:solidFill>
+            <a:schemeClr val="phClr"/>
+          </a:solidFill>
+          <a:prstDash val="solid"/>
+          <a:miter lim="800000"/>
+        </a:ln>
+        <a:ln w="12700" cap="flat" cmpd="sng" algn="ctr">
+          <a:solidFill>
+            <a:schemeClr val="phClr"/>
+          </a:solidFill>
+          <a:prstDash val="solid"/>
+          <a:miter lim="800000"/>
+        </a:ln>
+        <a:ln w="19050" cap="flat" cmpd="sng" algn="ctr">
+          <a:solidFill>
+            <a:schemeClr val="phClr"/>
+          </a:solidFill>
+          <a:prstDash val="solid"/>
+          <a:miter lim="800000"/>
+        </a:ln>
+      </a:lnStyleLst>
+      <a:effectStyleLst>
+        <a:effectStyle>
+          <a:effectLst/>
+        </a:effectStyle>
+        <a:effectStyle>
+          <a:effectLst/>
+        </a:effectStyle>
+        <a:effectStyle>
+          <a:effectLst>
+            <a:outerShdw blurRad="57150" dist="19050" dir="5400000" algn="ctr" rotWithShape="0">
+              <a:srgbClr val="000000">
+                <a:alpha val="63000"/>
+              </a:srgbClr>
+            </a:outerShdw>
+          </a:effectLst>
+        </a:effectStyle>
+      </a:effectStyleLst>
+      <a:bgFillStyleLst>
+        <a:solidFill>
+          <a:schemeClr val="phClr"/>
+        </a:solidFill>
+        <a:solidFill>
+          <a:schemeClr val="phClr">
+            <a:tint val="95000"/>
+            <a:satMod val="170000"/>
+          </a:schemeClr>
+        </a:solidFill>
+        <a:gradFill rotWithShape="1">
+          <a:gsLst>
+            <a:gs pos="0">
+              <a:schemeClr val="phClr">
+                <a:tint val="93000"/>
+                <a:satMod val="150000"/>
+                <a:shade val="98000"/>
+                <a:lumMod val="102000"/>
+              </a:schemeClr>
+            </a:gs>
+            <a:gs pos="50000">
+              <a:schemeClr val="phClr">
+                <a:tint val="98000"/>
+                <a:satMod val="130000"/>
+                <a:shade val="90000"/>
+                <a:lumMod val="103000"/>
+              </a:schemeClr>
+            </a:gs>
+            <a:gs pos="100000">
+              <a:schemeClr val="phClr">
+                <a:shade val="63000"/>
+                <a:satMod val="120000"/>
+              </a:schemeClr>
+            </a:gs>
+          </a:gsLst>
+          <a:lin ang="5400000" scaled="0"/>
+        </a:gradFill>
+      </a:bgFillStyleLst>
+    </a:fmtScheme>
+  </a:themeElements>
+  <a:objectDefaults/>
+  <a:extraClrSchemeLst/>
+  <a:extLst>
+    <a:ext uri="{05A4C25C-085E-4340-85A3-A5531E510DB2}">
+      <thm15:themeFamily xmlns:thm15="http://schemas.microsoft.com/office/thememl/2012/main" name="Office Theme" id="{62F939B6-93AF-4DB8-9C6B-D6C7DFDC589F}" vid="{4A3C46E8-61CC-4603-A589-7422A47A8E4A}"/>
+    </a:ext>
+  </a:extLst>
+</a:theme>
 </file>
</xml_diff>